<commit_message>
`Removed files and updated code in various directories`
</commit_message>
<xml_diff>
--- a/Docs/ppt-t24-27-09.pptx
+++ b/Docs/ppt-t24-27-09.pptx
@@ -5,7 +5,7 @@
     <p:sldMasterId id="2147483706" r:id="rId1"/>
   </p:sldMasterIdLst>
   <p:notesMasterIdLst>
-    <p:notesMasterId r:id="rId16"/>
+    <p:notesMasterId r:id="rId17"/>
   </p:notesMasterIdLst>
   <p:sldIdLst>
     <p:sldId id="261" r:id="rId2"/>
@@ -20,8 +20,9 @@
     <p:sldId id="291" r:id="rId11"/>
     <p:sldId id="293" r:id="rId12"/>
     <p:sldId id="292" r:id="rId13"/>
-    <p:sldId id="286" r:id="rId14"/>
-    <p:sldId id="288" r:id="rId15"/>
+    <p:sldId id="295" r:id="rId14"/>
+    <p:sldId id="286" r:id="rId15"/>
+    <p:sldId id="288" r:id="rId16"/>
   </p:sldIdLst>
   <p:sldSz cx="12192000" cy="6858000"/>
   <p:notesSz cx="6858000" cy="9144000"/>
@@ -909,7 +910,7 @@
         <a:p>
           <a:r>
             <a:rPr lang="en-US" dirty="0"/>
-            <a:t>To provide AI-based, personalized crop recommendations considering environmental.</a:t>
+            <a:t>To provide ML-based, personalized crop recommendations considering environmental.</a:t>
           </a:r>
           <a:endParaRPr lang="en-IN" dirty="0"/>
         </a:p>
@@ -1245,7 +1246,7 @@
           </a:pPr>
           <a:r>
             <a:rPr lang="en-US" sz="1600" kern="1200" dirty="0"/>
-            <a:t>To provide AI-based, personalized crop recommendations considering environmental.</a:t>
+            <a:t>To provide ML-based, personalized crop recommendations considering environmental.</a:t>
           </a:r>
           <a:endParaRPr lang="en-IN" sz="1600" kern="1200" dirty="0"/>
         </a:p>
@@ -2828,7 +2829,7 @@
           <a:p>
             <a:fld id="{D823B6CE-4736-4336-9B97-5711116D877B}" type="datetimeFigureOut">
               <a:rPr lang="en-US" smtClean="0"/>
-              <a:t>2/12/2026</a:t>
+              <a:t>2/13/2026</a:t>
             </a:fld>
             <a:endParaRPr lang="en-US"/>
           </a:p>
@@ -3332,7 +3333,7 @@
           <a:p>
             <a:fld id="{BC88EC33-4272-4021-8BBD-6FEC436AE4E7}" type="datetime1">
               <a:rPr lang="en-US" smtClean="0"/>
-              <a:t>2/12/2026</a:t>
+              <a:t>2/13/2026</a:t>
             </a:fld>
             <a:endParaRPr lang="en-US"/>
           </a:p>
@@ -3541,7 +3542,7 @@
           <a:p>
             <a:fld id="{46F235F9-EEE0-4794-91EE-ED9ADC804804}" type="datetime1">
               <a:rPr lang="en-US" smtClean="0"/>
-              <a:t>2/12/2026</a:t>
+              <a:t>2/13/2026</a:t>
             </a:fld>
             <a:endParaRPr lang="en-US"/>
           </a:p>
@@ -3812,7 +3813,7 @@
           <a:p>
             <a:fld id="{73AB6154-D7FF-4E39-A28F-AD0E9A9DAA08}" type="datetime1">
               <a:rPr lang="en-US" smtClean="0"/>
-              <a:t>2/12/2026</a:t>
+              <a:t>2/13/2026</a:t>
             </a:fld>
             <a:endParaRPr lang="en-US"/>
           </a:p>
@@ -3987,7 +3988,7 @@
           <a:p>
             <a:fld id="{EB09FBFF-520D-470F-90A1-63E712D4F2E2}" type="datetime1">
               <a:rPr lang="en-US" smtClean="0"/>
-              <a:t>2/12/2026</a:t>
+              <a:t>2/13/2026</a:t>
             </a:fld>
             <a:endParaRPr lang="en-US"/>
           </a:p>
@@ -4345,7 +4346,7 @@
           <a:p>
             <a:fld id="{77112896-DA28-4E64-ADAB-2FA83B2B750A}" type="datetime1">
               <a:rPr lang="en-US" smtClean="0"/>
-              <a:t>2/12/2026</a:t>
+              <a:t>2/13/2026</a:t>
             </a:fld>
             <a:endParaRPr lang="en-US"/>
           </a:p>
@@ -4621,7 +4622,7 @@
           <a:p>
             <a:fld id="{D8BBF698-F24E-48C9-A779-7273E04E2E35}" type="datetime1">
               <a:rPr lang="en-US" smtClean="0"/>
-              <a:t>2/12/2026</a:t>
+              <a:t>2/13/2026</a:t>
             </a:fld>
             <a:endParaRPr lang="en-US"/>
           </a:p>
@@ -5001,7 +5002,7 @@
           <a:p>
             <a:fld id="{A633F6D7-9F14-45F5-96C3-DE053C34307F}" type="datetime1">
               <a:rPr lang="en-US" smtClean="0"/>
-              <a:t>2/12/2026</a:t>
+              <a:t>2/13/2026</a:t>
             </a:fld>
             <a:endParaRPr lang="en-US"/>
           </a:p>
@@ -5120,7 +5121,7 @@
           <a:p>
             <a:fld id="{50DCE1D6-3549-4483-91A5-CB29157750D2}" type="datetime1">
               <a:rPr lang="en-US" smtClean="0"/>
-              <a:t>2/12/2026</a:t>
+              <a:t>2/13/2026</a:t>
             </a:fld>
             <a:endParaRPr lang="en-US"/>
           </a:p>
@@ -5306,7 +5307,7 @@
           <a:p>
             <a:fld id="{7EF50A87-DAA4-4037-A442-BA90CA860B93}" type="datetime1">
               <a:rPr lang="en-US" smtClean="0"/>
-              <a:t>2/12/2026</a:t>
+              <a:t>2/13/2026</a:t>
             </a:fld>
             <a:endParaRPr lang="en-US"/>
           </a:p>
@@ -5675,7 +5676,7 @@
           <a:p>
             <a:fld id="{C4BBF67E-3B80-47BA-A771-BBA0E25A5982}" type="datetime1">
               <a:rPr lang="en-US" smtClean="0"/>
-              <a:t>2/12/2026</a:t>
+              <a:t>2/13/2026</a:t>
             </a:fld>
             <a:endParaRPr lang="en-US"/>
           </a:p>
@@ -6072,7 +6073,7 @@
           <a:p>
             <a:fld id="{B27F6996-91C9-4B9B-874A-F80223127AF9}" type="datetime1">
               <a:rPr lang="en-US" smtClean="0"/>
-              <a:t>2/12/2026</a:t>
+              <a:t>2/13/2026</a:t>
             </a:fld>
             <a:endParaRPr lang="en-US"/>
           </a:p>
@@ -6374,7 +6375,7 @@
           <a:p>
             <a:fld id="{54D3D7A2-D191-47B2-954A-6B32FB59E2AA}" type="datetime1">
               <a:rPr lang="en-US" smtClean="0"/>
-              <a:t>2/12/2026</a:t>
+              <a:t>2/13/2026</a:t>
             </a:fld>
             <a:endParaRPr lang="en-US"/>
           </a:p>
@@ -7245,12 +7246,12 @@
               <a:buNone/>
             </a:pPr>
             <a:r>
-              <a:rPr lang="en-IN" sz="2400" b="1" kern="0" dirty="0">
+              <a:rPr lang="en-US" sz="2400" b="1" kern="0">
                 <a:effectLst/>
                 <a:latin typeface="Times New Roman" panose="02020603050405020304" pitchFamily="18" charset="0"/>
                 <a:ea typeface="Times New Roman" panose="02020603050405020304" pitchFamily="18" charset="0"/>
               </a:rPr>
-              <a:t>FarmConnect: Next-Generation Agriculture with AI Based Guidance,         Scheme Integration, and Community Engagement</a:t>
+              <a:t>FARMCONNECT: CROP RECOMMENDATION, GOVERNMENT SCHEME AND COMMUNITY SUPPORT</a:t>
             </a:r>
             <a:endParaRPr lang="en-IN" sz="1100" b="1" kern="0" dirty="0">
               <a:effectLst/>
@@ -7507,15 +7508,20 @@
           <p:nvPr/>
         </p:nvPicPr>
         <p:blipFill>
-          <a:blip r:embed="rId2"/>
-          <a:stretch>
-            <a:fillRect/>
-          </a:stretch>
+          <a:blip r:embed="rId2">
+            <a:extLst>
+              <a:ext uri="{28A0092B-C50C-407E-A947-70E740481C1C}">
+                <a14:useLocalDpi xmlns:a14="http://schemas.microsoft.com/office/drawing/2010/main" val="0"/>
+              </a:ext>
+            </a:extLst>
+          </a:blip>
+          <a:srcRect/>
+          <a:stretch/>
         </p:blipFill>
         <p:spPr>
           <a:xfrm>
-            <a:off x="1557557" y="1136105"/>
-            <a:ext cx="9433904" cy="5139180"/>
+            <a:off x="1319719" y="1337950"/>
+            <a:ext cx="9433904" cy="4517924"/>
           </a:xfrm>
           <a:prstGeom prst="rect">
             <a:avLst/>
@@ -7696,10 +7702,10 @@
       </p:cxnSp>
       <p:pic>
         <p:nvPicPr>
-          <p:cNvPr id="2" name="Picture 1">
+          <p:cNvPr id="9" name="Picture 8">
             <a:extLst>
               <a:ext uri="{FF2B5EF4-FFF2-40B4-BE49-F238E27FC236}">
-                <a16:creationId xmlns:a16="http://schemas.microsoft.com/office/drawing/2014/main" id="{C15EDBC8-83F9-1D1F-BF36-AF9BB49DF9B2}"/>
+                <a16:creationId xmlns:a16="http://schemas.microsoft.com/office/drawing/2014/main" id="{2B4DDB78-1911-0C97-99E0-AB649147C434}"/>
               </a:ext>
             </a:extLst>
           </p:cNvPr>
@@ -7716,8 +7722,8 @@
         </p:blipFill>
         <p:spPr>
           <a:xfrm>
-            <a:off x="937163" y="1188737"/>
-            <a:ext cx="10485013" cy="4853741"/>
+            <a:off x="768485" y="1173497"/>
+            <a:ext cx="10243226" cy="4874100"/>
           </a:xfrm>
           <a:prstGeom prst="rect">
             <a:avLst/>
@@ -7898,10 +7904,10 @@
       </p:cxnSp>
       <p:pic>
         <p:nvPicPr>
-          <p:cNvPr id="2" name="Picture 1">
+          <p:cNvPr id="9" name="Picture 8">
             <a:extLst>
               <a:ext uri="{FF2B5EF4-FFF2-40B4-BE49-F238E27FC236}">
-                <a16:creationId xmlns:a16="http://schemas.microsoft.com/office/drawing/2014/main" id="{5E853FE2-5E4E-1F62-EA7B-FAE79DDBA547}"/>
+                <a16:creationId xmlns:a16="http://schemas.microsoft.com/office/drawing/2014/main" id="{78730ADB-C3EB-65EC-D2E0-F2F64637DC50}"/>
               </a:ext>
             </a:extLst>
           </p:cNvPr>
@@ -7918,8 +7924,8 @@
         </p:blipFill>
         <p:spPr>
           <a:xfrm>
-            <a:off x="1538896" y="1070790"/>
-            <a:ext cx="9430991" cy="5137594"/>
+            <a:off x="612843" y="1163469"/>
+            <a:ext cx="10088880" cy="4828592"/>
           </a:xfrm>
           <a:prstGeom prst="rect">
             <a:avLst/>
@@ -7947,6 +7953,208 @@
         <p:cNvPr id="1" name="">
           <a:extLst>
             <a:ext uri="{FF2B5EF4-FFF2-40B4-BE49-F238E27FC236}">
+              <a16:creationId xmlns:a16="http://schemas.microsoft.com/office/drawing/2014/main" id="{A85362D6-4415-9A37-6EA2-7A73BC136075}"/>
+            </a:ext>
+          </a:extLst>
+        </p:cNvPr>
+        <p:cNvGrpSpPr/>
+        <p:nvPr/>
+      </p:nvGrpSpPr>
+      <p:grpSpPr>
+        <a:xfrm>
+          <a:off x="0" y="0"/>
+          <a:ext cx="0" cy="0"/>
+          <a:chOff x="0" y="0"/>
+          <a:chExt cx="0" cy="0"/>
+        </a:xfrm>
+      </p:grpSpPr>
+      <p:sp>
+        <p:nvSpPr>
+          <p:cNvPr id="3" name="Slide Number Placeholder 2">
+            <a:extLst>
+              <a:ext uri="{FF2B5EF4-FFF2-40B4-BE49-F238E27FC236}">
+                <a16:creationId xmlns:a16="http://schemas.microsoft.com/office/drawing/2014/main" id="{0F3DA556-02B8-9BFD-E78A-B9F707A5FFE5}"/>
+              </a:ext>
+            </a:extLst>
+          </p:cNvPr>
+          <p:cNvSpPr>
+            <a:spLocks noGrp="1"/>
+          </p:cNvSpPr>
+          <p:nvPr>
+            <p:ph type="sldNum" sz="quarter" idx="12"/>
+          </p:nvPr>
+        </p:nvSpPr>
+        <p:spPr/>
+        <p:txBody>
+          <a:bodyPr/>
+          <a:lstStyle/>
+          <a:p>
+            <a:fld id="{CDDC133B-56CF-4BD7-AF41-F9CFD64DD942}" type="slidenum">
+              <a:rPr lang="en-US" smtClean="0"/>
+              <a:pPr/>
+              <a:t>13</a:t>
+            </a:fld>
+            <a:endParaRPr lang="en-US"/>
+          </a:p>
+        </p:txBody>
+      </p:sp>
+      <p:sp>
+        <p:nvSpPr>
+          <p:cNvPr id="4" name="Title 1">
+            <a:extLst>
+              <a:ext uri="{FF2B5EF4-FFF2-40B4-BE49-F238E27FC236}">
+                <a16:creationId xmlns:a16="http://schemas.microsoft.com/office/drawing/2014/main" id="{7DA593FC-DA89-1B3B-EEAA-F4FED7E366CB}"/>
+              </a:ext>
+            </a:extLst>
+          </p:cNvPr>
+          <p:cNvSpPr txBox="1">
+            <a:spLocks/>
+          </p:cNvSpPr>
+          <p:nvPr/>
+        </p:nvSpPr>
+        <p:spPr>
+          <a:xfrm>
+            <a:off x="1051560" y="-121958"/>
+            <a:ext cx="10088880" cy="1124084"/>
+          </a:xfrm>
+          <a:prstGeom prst="rect">
+            <a:avLst/>
+          </a:prstGeom>
+        </p:spPr>
+        <p:txBody>
+          <a:bodyPr vert="horz" lIns="91440" tIns="45720" rIns="91440" bIns="45720" rtlCol="0" anchor="b">
+            <a:normAutofit/>
+          </a:bodyPr>
+          <a:lstStyle>
+            <a:lvl1pPr algn="l" defTabSz="914400" rtl="0" eaLnBrk="1" latinLnBrk="0" hangingPunct="1">
+              <a:lnSpc>
+                <a:spcPct val="85000"/>
+              </a:lnSpc>
+              <a:spcBef>
+                <a:spcPct val="0"/>
+              </a:spcBef>
+              <a:buNone/>
+              <a:defRPr sz="4800" kern="1200" spc="-50" baseline="0">
+                <a:solidFill>
+                  <a:schemeClr val="tx1">
+                    <a:lumMod val="75000"/>
+                    <a:lumOff val="25000"/>
+                  </a:schemeClr>
+                </a:solidFill>
+                <a:latin typeface="+mj-lt"/>
+                <a:ea typeface="+mj-ea"/>
+                <a:cs typeface="+mj-cs"/>
+              </a:defRPr>
+            </a:lvl1pPr>
+          </a:lstStyle>
+          <a:p>
+            <a:pPr algn="ctr"/>
+            <a:r>
+              <a:rPr lang="en-US" b="1" dirty="0">
+                <a:latin typeface="Algerian" panose="04020705040A02060702" pitchFamily="82" charset="0"/>
+              </a:rPr>
+              <a:t>Project completion RESULTS</a:t>
+            </a:r>
+          </a:p>
+        </p:txBody>
+      </p:sp>
+      <p:cxnSp>
+        <p:nvCxnSpPr>
+          <p:cNvPr id="6" name="Straight Connector 5">
+            <a:extLst>
+              <a:ext uri="{FF2B5EF4-FFF2-40B4-BE49-F238E27FC236}">
+                <a16:creationId xmlns:a16="http://schemas.microsoft.com/office/drawing/2014/main" id="{BF4306F3-D063-0156-755A-BAD301830107}"/>
+              </a:ext>
+            </a:extLst>
+          </p:cNvPr>
+          <p:cNvCxnSpPr>
+            <a:cxnSpLocks/>
+          </p:cNvCxnSpPr>
+          <p:nvPr/>
+        </p:nvCxnSpPr>
+        <p:spPr>
+          <a:xfrm>
+            <a:off x="1319719" y="1002126"/>
+            <a:ext cx="9552562" cy="0"/>
+          </a:xfrm>
+          <a:prstGeom prst="line">
+            <a:avLst/>
+          </a:prstGeom>
+          <a:ln>
+            <a:solidFill>
+              <a:schemeClr val="tx1">
+                <a:lumMod val="50000"/>
+                <a:lumOff val="50000"/>
+              </a:schemeClr>
+            </a:solidFill>
+          </a:ln>
+        </p:spPr>
+        <p:style>
+          <a:lnRef idx="3">
+            <a:schemeClr val="dk1"/>
+          </a:lnRef>
+          <a:fillRef idx="0">
+            <a:schemeClr val="dk1"/>
+          </a:fillRef>
+          <a:effectRef idx="2">
+            <a:schemeClr val="dk1"/>
+          </a:effectRef>
+          <a:fontRef idx="minor">
+            <a:schemeClr val="tx1"/>
+          </a:fontRef>
+        </p:style>
+      </p:cxnSp>
+      <p:pic>
+        <p:nvPicPr>
+          <p:cNvPr id="5" name="Picture 4">
+            <a:extLst>
+              <a:ext uri="{FF2B5EF4-FFF2-40B4-BE49-F238E27FC236}">
+                <a16:creationId xmlns:a16="http://schemas.microsoft.com/office/drawing/2014/main" id="{4F491576-9C11-0E8B-4A67-8B1E2ED79A73}"/>
+              </a:ext>
+            </a:extLst>
+          </p:cNvPr>
+          <p:cNvPicPr>
+            <a:picLocks noChangeAspect="1"/>
+          </p:cNvPicPr>
+          <p:nvPr/>
+        </p:nvPicPr>
+        <p:blipFill>
+          <a:blip r:embed="rId2"/>
+          <a:stretch>
+            <a:fillRect/>
+          </a:stretch>
+        </p:blipFill>
+        <p:spPr>
+          <a:xfrm>
+            <a:off x="940075" y="1176572"/>
+            <a:ext cx="10515600" cy="4953122"/>
+          </a:xfrm>
+          <a:prstGeom prst="rect">
+            <a:avLst/>
+          </a:prstGeom>
+        </p:spPr>
+      </p:pic>
+    </p:spTree>
+    <p:extLst>
+      <p:ext uri="{BB962C8B-B14F-4D97-AF65-F5344CB8AC3E}">
+        <p14:creationId xmlns:p14="http://schemas.microsoft.com/office/powerpoint/2010/main" val="4257441542"/>
+      </p:ext>
+    </p:extLst>
+  </p:cSld>
+  <p:clrMapOvr>
+    <a:masterClrMapping/>
+  </p:clrMapOvr>
+</p:sld>
+</file>
+
+<file path=ppt/slides/slide14.xml><?xml version="1.0" encoding="utf-8"?>
+<p:sld xmlns:a="http://schemas.openxmlformats.org/drawingml/2006/main" xmlns:r="http://schemas.openxmlformats.org/officeDocument/2006/relationships" xmlns:p="http://schemas.openxmlformats.org/presentationml/2006/main">
+  <p:cSld>
+    <p:spTree>
+      <p:nvGrpSpPr>
+        <p:cNvPr id="1" name="">
+          <a:extLst>
+            <a:ext uri="{FF2B5EF4-FFF2-40B4-BE49-F238E27FC236}">
               <a16:creationId xmlns:a16="http://schemas.microsoft.com/office/drawing/2014/main" id="{DF7B05D6-8762-AF41-DD0B-6CA9DCA026B5}"/>
             </a:ext>
           </a:extLst>
@@ -7986,7 +8194,7 @@
             <a:fld id="{CDDC133B-56CF-4BD7-AF41-F9CFD64DD942}" type="slidenum">
               <a:rPr lang="en-US" smtClean="0"/>
               <a:pPr/>
-              <a:t>13</a:t>
+              <a:t>14</a:t>
             </a:fld>
             <a:endParaRPr lang="en-US"/>
           </a:p>
@@ -8254,7 +8462,7 @@
 </p:sld>
 </file>
 
-<file path=ppt/slides/slide14.xml><?xml version="1.0" encoding="utf-8"?>
+<file path=ppt/slides/slide15.xml><?xml version="1.0" encoding="utf-8"?>
 <p:sld xmlns:a="http://schemas.openxmlformats.org/drawingml/2006/main" xmlns:r="http://schemas.openxmlformats.org/officeDocument/2006/relationships" xmlns:p="http://schemas.openxmlformats.org/presentationml/2006/main">
   <p:cSld>
     <p:spTree>
@@ -8295,7 +8503,7 @@
             <a:fld id="{CDDC133B-56CF-4BD7-AF41-F9CFD64DD942}" type="slidenum">
               <a:rPr lang="en-US" smtClean="0"/>
               <a:pPr/>
-              <a:t>14</a:t>
+              <a:t>15</a:t>
             </a:fld>
             <a:endParaRPr lang="en-US"/>
           </a:p>
@@ -8927,7 +9135,7 @@
           <p:nvPr>
             <p:extLst>
               <p:ext uri="{D42A27DB-BD31-4B8C-83A1-F6EECF244321}">
-                <p14:modId xmlns:p14="http://schemas.microsoft.com/office/powerpoint/2010/main" val="2096343361"/>
+                <p14:modId xmlns:p14="http://schemas.microsoft.com/office/powerpoint/2010/main" val="574566063"/>
               </p:ext>
             </p:extLst>
           </p:nvPr>
@@ -10640,10 +10848,10 @@
       </p:sp>
       <p:pic>
         <p:nvPicPr>
-          <p:cNvPr id="5" name="Picture 4">
+          <p:cNvPr id="8" name="Picture 7">
             <a:extLst>
               <a:ext uri="{FF2B5EF4-FFF2-40B4-BE49-F238E27FC236}">
-                <a16:creationId xmlns:a16="http://schemas.microsoft.com/office/drawing/2014/main" id="{65AA91AB-7A10-22EF-9689-37F9ADD97E96}"/>
+                <a16:creationId xmlns:a16="http://schemas.microsoft.com/office/drawing/2014/main" id="{4763B30A-3C2B-E4B6-24FA-64A9CC6611CA}"/>
               </a:ext>
             </a:extLst>
           </p:cNvPr>
@@ -10653,21 +10861,15 @@
           <p:nvPr/>
         </p:nvPicPr>
         <p:blipFill>
-          <a:blip r:embed="rId2" cstate="print">
-            <a:extLst>
-              <a:ext uri="{28A0092B-C50C-407E-A947-70E740481C1C}">
-                <a14:useLocalDpi xmlns:a14="http://schemas.microsoft.com/office/drawing/2010/main" val="0"/>
-              </a:ext>
-            </a:extLst>
-          </a:blip>
+          <a:blip r:embed="rId2"/>
           <a:stretch>
             <a:fillRect/>
           </a:stretch>
         </p:blipFill>
         <p:spPr>
           <a:xfrm>
-            <a:off x="506546" y="1471643"/>
-            <a:ext cx="5397297" cy="3598198"/>
+            <a:off x="816682" y="1332579"/>
+            <a:ext cx="5087161" cy="4069729"/>
           </a:xfrm>
           <a:prstGeom prst="rect">
             <a:avLst/>

</xml_diff>